<commit_message>
slight wording change re: librem
</commit_message>
<xml_diff>
--- a/2019-11-12 - CorkSec #77 - Android Privacy v3/2019-11-12 - CorkSec #77 - Android Privacy v3.pptx
+++ b/2019-11-12 - CorkSec #77 - Android Privacy v3/2019-11-12 - CorkSec #77 - Android Privacy v3.pptx
@@ -5142,7 +5142,17 @@
           <a:p>
             <a:r>
               <a:rPr lang="en-IE"/>
-              <a:t>D. Micay - Hard to catch up on AOSP hardening efforts from stock linux</a:t>
+              <a:t>Hard to catch up on AOSP hardening efforts from stock linux (</a:t>
+            </a:r>
+            <a:r>
+              <a:rPr lang="en-IE">
+                <a:hlinkClick r:id="rId2"/>
+              </a:rPr>
+              <a:t>source</a:t>
+            </a:r>
+            <a:r>
+              <a:rPr lang="en-IE"/>
+              <a:t>)</a:t>
             </a:r>
           </a:p>
         </p:txBody>
@@ -5162,7 +5172,7 @@
           <p:nvPr/>
         </p:nvPicPr>
         <p:blipFill>
-          <a:blip r:embed="rId2"/>
+          <a:blip r:embed="rId3"/>
           <a:stretch>
             <a:fillRect/>
           </a:stretch>
@@ -5192,7 +5202,7 @@
           <p:nvPr/>
         </p:nvPicPr>
         <p:blipFill>
-          <a:blip r:embed="rId3" cstate="screen">
+          <a:blip r:embed="rId4" cstate="screen">
             <a:extLst>
               <a:ext uri="{28A0092B-C50C-407E-A947-70E740481C1C}">
                 <a14:useLocalDpi xmlns:a14="http://schemas.microsoft.com/office/drawing/2010/main"/>

</xml_diff>